<commit_message>
Vastly improve the code and documentation for grade_magic
</commit_message>
<xml_diff>
--- a/docs/_static/pedal-overview.pptx
+++ b/docs/_static/pedal-overview.pptx
@@ -270,7 +270,7 @@
           <a:p>
             <a:fld id="{3A979BF9-124F-4BB9-ADB5-5719B90CB8FD}" type="datetimeFigureOut">
               <a:rPr lang="en-US" smtClean="0"/>
-              <a:t>7/22/2018</a:t>
+              <a:t>8/10/2018</a:t>
             </a:fld>
             <a:endParaRPr lang="en-US"/>
           </a:p>
@@ -468,7 +468,7 @@
           <a:p>
             <a:fld id="{3A979BF9-124F-4BB9-ADB5-5719B90CB8FD}" type="datetimeFigureOut">
               <a:rPr lang="en-US" smtClean="0"/>
-              <a:t>7/22/2018</a:t>
+              <a:t>8/10/2018</a:t>
             </a:fld>
             <a:endParaRPr lang="en-US"/>
           </a:p>
@@ -676,7 +676,7 @@
           <a:p>
             <a:fld id="{3A979BF9-124F-4BB9-ADB5-5719B90CB8FD}" type="datetimeFigureOut">
               <a:rPr lang="en-US" smtClean="0"/>
-              <a:t>7/22/2018</a:t>
+              <a:t>8/10/2018</a:t>
             </a:fld>
             <a:endParaRPr lang="en-US"/>
           </a:p>
@@ -874,7 +874,7 @@
           <a:p>
             <a:fld id="{3A979BF9-124F-4BB9-ADB5-5719B90CB8FD}" type="datetimeFigureOut">
               <a:rPr lang="en-US" smtClean="0"/>
-              <a:t>7/22/2018</a:t>
+              <a:t>8/10/2018</a:t>
             </a:fld>
             <a:endParaRPr lang="en-US"/>
           </a:p>
@@ -1149,7 +1149,7 @@
           <a:p>
             <a:fld id="{3A979BF9-124F-4BB9-ADB5-5719B90CB8FD}" type="datetimeFigureOut">
               <a:rPr lang="en-US" smtClean="0"/>
-              <a:t>7/22/2018</a:t>
+              <a:t>8/10/2018</a:t>
             </a:fld>
             <a:endParaRPr lang="en-US"/>
           </a:p>
@@ -1414,7 +1414,7 @@
           <a:p>
             <a:fld id="{3A979BF9-124F-4BB9-ADB5-5719B90CB8FD}" type="datetimeFigureOut">
               <a:rPr lang="en-US" smtClean="0"/>
-              <a:t>7/22/2018</a:t>
+              <a:t>8/10/2018</a:t>
             </a:fld>
             <a:endParaRPr lang="en-US"/>
           </a:p>
@@ -1826,7 +1826,7 @@
           <a:p>
             <a:fld id="{3A979BF9-124F-4BB9-ADB5-5719B90CB8FD}" type="datetimeFigureOut">
               <a:rPr lang="en-US" smtClean="0"/>
-              <a:t>7/22/2018</a:t>
+              <a:t>8/10/2018</a:t>
             </a:fld>
             <a:endParaRPr lang="en-US"/>
           </a:p>
@@ -1967,7 +1967,7 @@
           <a:p>
             <a:fld id="{3A979BF9-124F-4BB9-ADB5-5719B90CB8FD}" type="datetimeFigureOut">
               <a:rPr lang="en-US" smtClean="0"/>
-              <a:t>7/22/2018</a:t>
+              <a:t>8/10/2018</a:t>
             </a:fld>
             <a:endParaRPr lang="en-US"/>
           </a:p>
@@ -2080,7 +2080,7 @@
           <a:p>
             <a:fld id="{3A979BF9-124F-4BB9-ADB5-5719B90CB8FD}" type="datetimeFigureOut">
               <a:rPr lang="en-US" smtClean="0"/>
-              <a:t>7/22/2018</a:t>
+              <a:t>8/10/2018</a:t>
             </a:fld>
             <a:endParaRPr lang="en-US"/>
           </a:p>
@@ -2391,7 +2391,7 @@
           <a:p>
             <a:fld id="{3A979BF9-124F-4BB9-ADB5-5719B90CB8FD}" type="datetimeFigureOut">
               <a:rPr lang="en-US" smtClean="0"/>
-              <a:t>7/22/2018</a:t>
+              <a:t>8/10/2018</a:t>
             </a:fld>
             <a:endParaRPr lang="en-US"/>
           </a:p>
@@ -2679,7 +2679,7 @@
           <a:p>
             <a:fld id="{3A979BF9-124F-4BB9-ADB5-5719B90CB8FD}" type="datetimeFigureOut">
               <a:rPr lang="en-US" smtClean="0"/>
-              <a:t>7/22/2018</a:t>
+              <a:t>8/10/2018</a:t>
             </a:fld>
             <a:endParaRPr lang="en-US"/>
           </a:p>
@@ -2920,7 +2920,7 @@
           <a:p>
             <a:fld id="{3A979BF9-124F-4BB9-ADB5-5719B90CB8FD}" type="datetimeFigureOut">
               <a:rPr lang="en-US" smtClean="0"/>
-              <a:t>7/22/2018</a:t>
+              <a:t>8/10/2018</a:t>
             </a:fld>
             <a:endParaRPr lang="en-US"/>
           </a:p>
@@ -3641,10 +3641,9 @@
           <a:lstStyle/>
           <a:p>
             <a:r>
-              <a:rPr lang="en-US" dirty="0" err="1"/>
-              <a:t>FirstComeFirstServe</a:t>
-            </a:r>
-            <a:endParaRPr lang="en-US" dirty="0"/>
+              <a:rPr lang="en-US" dirty="0"/>
+              <a:t>Simple</a:t>
+            </a:r>
           </a:p>
           <a:p>
             <a:r>
@@ -4541,58 +4540,6 @@
       </p:sp>
       <p:sp>
         <p:nvSpPr>
-          <p:cNvPr id="71" name="Rectangle 70">
-            <a:extLst>
-              <a:ext uri="{FF2B5EF4-FFF2-40B4-BE49-F238E27FC236}">
-                <a16:creationId xmlns:a16="http://schemas.microsoft.com/office/drawing/2014/main" id="{FF97123C-3CB7-481B-8B46-273E7E16D4F5}"/>
-              </a:ext>
-            </a:extLst>
-          </p:cNvPr>
-          <p:cNvSpPr/>
-          <p:nvPr/>
-        </p:nvSpPr>
-        <p:spPr>
-          <a:xfrm>
-            <a:off x="8590422" y="1763066"/>
-            <a:ext cx="6096000" cy="1200329"/>
-          </a:xfrm>
-          <a:prstGeom prst="rect">
-            <a:avLst/>
-          </a:prstGeom>
-        </p:spPr>
-        <p:txBody>
-          <a:bodyPr>
-            <a:spAutoFit/>
-          </a:bodyPr>
-          <a:lstStyle/>
-          <a:p>
-            <a:r>
-              <a:rPr lang="en-US" dirty="0"/>
-              <a:t> Message: str</a:t>
-            </a:r>
-          </a:p>
-          <a:p>
-            <a:r>
-              <a:rPr lang="en-US" dirty="0"/>
-              <a:t>  Priority: message</a:t>
-            </a:r>
-          </a:p>
-          <a:p>
-            <a:r>
-              <a:rPr lang="en-US" dirty="0"/>
-              <a:t>  Line/Column/Position/Range: int?</a:t>
-            </a:r>
-          </a:p>
-          <a:p>
-            <a:r>
-              <a:rPr lang="en-US" dirty="0"/>
-              <a:t>  …?</a:t>
-            </a:r>
-          </a:p>
-        </p:txBody>
-      </p:sp>
-      <p:sp>
-        <p:nvSpPr>
           <p:cNvPr id="72" name="Rectangle 71">
             <a:extLst>
               <a:ext uri="{FF2B5EF4-FFF2-40B4-BE49-F238E27FC236}">
@@ -4873,8 +4820,13 @@
           <a:p>
             <a:r>
               <a:rPr lang="en-US" dirty="0"/>
-              <a:t>    where: position</a:t>
-            </a:r>
+              <a:t>    position: </a:t>
+            </a:r>
+            <a:r>
+              <a:rPr lang="en-US" dirty="0" err="1"/>
+              <a:t>dict</a:t>
+            </a:r>
+            <a:endParaRPr lang="en-US" dirty="0"/>
           </a:p>
         </p:txBody>
       </p:sp>

</xml_diff>

<commit_message>
Coverage tools, signature tools
</commit_message>
<xml_diff>
--- a/docs/_static/pedal-overview.pptx
+++ b/docs/_static/pedal-overview.pptx
@@ -255,7 +255,7 @@
           <a:p>
             <a:fld id="{3A979BF9-124F-4BB9-ADB5-5719B90CB8FD}" type="datetimeFigureOut">
               <a:rPr lang="en-US" smtClean="0"/>
-              <a:t>1/4/2019</a:t>
+              <a:t>1/17/2019</a:t>
             </a:fld>
             <a:endParaRPr lang="en-US"/>
           </a:p>
@@ -425,7 +425,7 @@
           <a:p>
             <a:fld id="{3A979BF9-124F-4BB9-ADB5-5719B90CB8FD}" type="datetimeFigureOut">
               <a:rPr lang="en-US" smtClean="0"/>
-              <a:t>1/4/2019</a:t>
+              <a:t>1/17/2019</a:t>
             </a:fld>
             <a:endParaRPr lang="en-US"/>
           </a:p>
@@ -605,7 +605,7 @@
           <a:p>
             <a:fld id="{3A979BF9-124F-4BB9-ADB5-5719B90CB8FD}" type="datetimeFigureOut">
               <a:rPr lang="en-US" smtClean="0"/>
-              <a:t>1/4/2019</a:t>
+              <a:t>1/17/2019</a:t>
             </a:fld>
             <a:endParaRPr lang="en-US"/>
           </a:p>
@@ -775,7 +775,7 @@
           <a:p>
             <a:fld id="{3A979BF9-124F-4BB9-ADB5-5719B90CB8FD}" type="datetimeFigureOut">
               <a:rPr lang="en-US" smtClean="0"/>
-              <a:t>1/4/2019</a:t>
+              <a:t>1/17/2019</a:t>
             </a:fld>
             <a:endParaRPr lang="en-US"/>
           </a:p>
@@ -1019,7 +1019,7 @@
           <a:p>
             <a:fld id="{3A979BF9-124F-4BB9-ADB5-5719B90CB8FD}" type="datetimeFigureOut">
               <a:rPr lang="en-US" smtClean="0"/>
-              <a:t>1/4/2019</a:t>
+              <a:t>1/17/2019</a:t>
             </a:fld>
             <a:endParaRPr lang="en-US"/>
           </a:p>
@@ -1251,7 +1251,7 @@
           <a:p>
             <a:fld id="{3A979BF9-124F-4BB9-ADB5-5719B90CB8FD}" type="datetimeFigureOut">
               <a:rPr lang="en-US" smtClean="0"/>
-              <a:t>1/4/2019</a:t>
+              <a:t>1/17/2019</a:t>
             </a:fld>
             <a:endParaRPr lang="en-US"/>
           </a:p>
@@ -1618,7 +1618,7 @@
           <a:p>
             <a:fld id="{3A979BF9-124F-4BB9-ADB5-5719B90CB8FD}" type="datetimeFigureOut">
               <a:rPr lang="en-US" smtClean="0"/>
-              <a:t>1/4/2019</a:t>
+              <a:t>1/17/2019</a:t>
             </a:fld>
             <a:endParaRPr lang="en-US"/>
           </a:p>
@@ -1736,7 +1736,7 @@
           <a:p>
             <a:fld id="{3A979BF9-124F-4BB9-ADB5-5719B90CB8FD}" type="datetimeFigureOut">
               <a:rPr lang="en-US" smtClean="0"/>
-              <a:t>1/4/2019</a:t>
+              <a:t>1/17/2019</a:t>
             </a:fld>
             <a:endParaRPr lang="en-US"/>
           </a:p>
@@ -1831,7 +1831,7 @@
           <a:p>
             <a:fld id="{3A979BF9-124F-4BB9-ADB5-5719B90CB8FD}" type="datetimeFigureOut">
               <a:rPr lang="en-US" smtClean="0"/>
-              <a:t>1/4/2019</a:t>
+              <a:t>1/17/2019</a:t>
             </a:fld>
             <a:endParaRPr lang="en-US"/>
           </a:p>
@@ -2108,7 +2108,7 @@
           <a:p>
             <a:fld id="{3A979BF9-124F-4BB9-ADB5-5719B90CB8FD}" type="datetimeFigureOut">
               <a:rPr lang="en-US" smtClean="0"/>
-              <a:t>1/4/2019</a:t>
+              <a:t>1/17/2019</a:t>
             </a:fld>
             <a:endParaRPr lang="en-US"/>
           </a:p>
@@ -2365,7 +2365,7 @@
           <a:p>
             <a:fld id="{3A979BF9-124F-4BB9-ADB5-5719B90CB8FD}" type="datetimeFigureOut">
               <a:rPr lang="en-US" smtClean="0"/>
-              <a:t>1/4/2019</a:t>
+              <a:t>1/17/2019</a:t>
             </a:fld>
             <a:endParaRPr lang="en-US"/>
           </a:p>
@@ -2578,7 +2578,7 @@
           <a:p>
             <a:fld id="{3A979BF9-124F-4BB9-ADB5-5719B90CB8FD}" type="datetimeFigureOut">
               <a:rPr lang="en-US" smtClean="0"/>
-              <a:t>1/4/2019</a:t>
+              <a:t>1/17/2019</a:t>
             </a:fld>
             <a:endParaRPr lang="en-US"/>
           </a:p>
@@ -4575,8 +4575,8 @@
         </p:nvSpPr>
         <p:spPr>
           <a:xfrm>
-            <a:off x="337625" y="2375218"/>
-            <a:ext cx="1188720" cy="548640"/>
+            <a:off x="667234" y="3587329"/>
+            <a:ext cx="1188720" cy="687803"/>
           </a:xfrm>
           <a:prstGeom prst="rect">
             <a:avLst/>
@@ -4617,7 +4617,7 @@
               <a:rPr lang="en-US" sz="1000" i="1" dirty="0">
                 <a:latin typeface="Century" panose="02040604050505020304" pitchFamily="18" charset="0"/>
               </a:rPr>
-              <a:t>A collection of Feedback</a:t>
+              <a:t>A collection of Feedback and Data</a:t>
             </a:r>
             <a:endParaRPr lang="en-US" sz="1000" dirty="0">
               <a:latin typeface="Century" panose="02040604050505020304" pitchFamily="18" charset="0"/>
@@ -4639,7 +4639,7 @@
         </p:nvSpPr>
         <p:spPr>
           <a:xfrm>
-            <a:off x="1883607" y="1533600"/>
+            <a:off x="2213216" y="2745712"/>
             <a:ext cx="4151433" cy="2721878"/>
           </a:xfrm>
           <a:prstGeom prst="rect">
@@ -4698,7 +4698,7 @@
         </p:nvSpPr>
         <p:spPr>
           <a:xfrm>
-            <a:off x="337626" y="1533600"/>
+            <a:off x="667235" y="2745712"/>
             <a:ext cx="1188720" cy="548640"/>
           </a:xfrm>
           <a:prstGeom prst="rect">
@@ -4759,7 +4759,7 @@
         </p:nvSpPr>
         <p:spPr>
           <a:xfrm>
-            <a:off x="343218" y="3367158"/>
+            <a:off x="672827" y="4579270"/>
             <a:ext cx="1188720" cy="548640"/>
           </a:xfrm>
           <a:prstGeom prst="rect">
@@ -4820,7 +4820,7 @@
         </p:nvSpPr>
         <p:spPr>
           <a:xfrm>
-            <a:off x="2095494" y="1807920"/>
+            <a:off x="2425103" y="3020032"/>
             <a:ext cx="1188720" cy="548640"/>
           </a:xfrm>
           <a:prstGeom prst="rect">
@@ -4881,7 +4881,7 @@
         </p:nvSpPr>
         <p:spPr>
           <a:xfrm>
-            <a:off x="2085512" y="2709790"/>
+            <a:off x="2415121" y="3921902"/>
             <a:ext cx="1361632" cy="548640"/>
           </a:xfrm>
           <a:prstGeom prst="rect">
@@ -4924,6 +4924,14 @@
                 <a:latin typeface="Century" panose="02040604050505020304" pitchFamily="18" charset="0"/>
               </a:rPr>
               <a:t>Type checking and other issue detection</a:t>
+            </a:r>
+          </a:p>
+          <a:p>
+            <a:r>
+              <a:rPr lang="en-US" sz="1000" i="1" dirty="0">
+                <a:latin typeface="Century" panose="02040604050505020304" pitchFamily="18" charset="0"/>
+              </a:rPr>
+              <a:t>Program analysis</a:t>
             </a:r>
           </a:p>
         </p:txBody>
@@ -4942,7 +4950,7 @@
         </p:nvSpPr>
         <p:spPr>
           <a:xfrm>
-            <a:off x="3808834" y="2788701"/>
+            <a:off x="4138443" y="4000813"/>
             <a:ext cx="1188720" cy="548640"/>
           </a:xfrm>
           <a:prstGeom prst="rect">
@@ -4985,6 +4993,14 @@
                 <a:latin typeface="Century" panose="02040604050505020304" pitchFamily="18" charset="0"/>
               </a:rPr>
               <a:t>Checks students' code for patterns</a:t>
+            </a:r>
+          </a:p>
+          <a:p>
+            <a:r>
+              <a:rPr lang="en-US" sz="1000" i="1" dirty="0">
+                <a:latin typeface="Century" panose="02040604050505020304" pitchFamily="18" charset="0"/>
+              </a:rPr>
+              <a:t>Code Inspection</a:t>
             </a:r>
           </a:p>
         </p:txBody>
@@ -5003,7 +5019,7 @@
         </p:nvSpPr>
         <p:spPr>
           <a:xfrm>
-            <a:off x="3745544" y="3611661"/>
+            <a:off x="4075153" y="4823773"/>
             <a:ext cx="1188720" cy="548640"/>
           </a:xfrm>
           <a:prstGeom prst="rect">
@@ -5064,7 +5080,7 @@
         </p:nvSpPr>
         <p:spPr>
           <a:xfrm>
-            <a:off x="2090532" y="3611661"/>
+            <a:off x="2420141" y="4823773"/>
             <a:ext cx="1361631" cy="548640"/>
           </a:xfrm>
           <a:prstGeom prst="rect">
@@ -5125,7 +5141,7 @@
         </p:nvSpPr>
         <p:spPr>
           <a:xfrm>
-            <a:off x="3573788" y="1693180"/>
+            <a:off x="3903397" y="2980576"/>
             <a:ext cx="1043347" cy="548640"/>
           </a:xfrm>
           <a:prstGeom prst="rect">
@@ -5186,7 +5202,7 @@
         </p:nvSpPr>
         <p:spPr>
           <a:xfrm>
-            <a:off x="4768943" y="2100898"/>
+            <a:off x="5098552" y="3313010"/>
             <a:ext cx="1188720" cy="548640"/>
           </a:xfrm>
           <a:prstGeom prst="rect">
@@ -5257,8 +5273,8 @@
         </p:nvCxnSpPr>
         <p:spPr>
           <a:xfrm flipV="1">
-            <a:off x="3284214" y="1967500"/>
-            <a:ext cx="289574" cy="114740"/>
+            <a:off x="3613823" y="3254896"/>
+            <a:ext cx="289574" cy="39456"/>
           </a:xfrm>
           <a:prstGeom prst="curvedConnector3">
             <a:avLst>
@@ -5302,7 +5318,7 @@
         </p:nvCxnSpPr>
         <p:spPr>
           <a:xfrm rot="16200000" flipH="1">
-            <a:off x="2551476" y="2494938"/>
+            <a:off x="2881085" y="3707050"/>
             <a:ext cx="353230" cy="76474"/>
           </a:xfrm>
           <a:prstGeom prst="curvedConnector3">
@@ -5347,7 +5363,7 @@
         </p:nvCxnSpPr>
         <p:spPr>
           <a:xfrm rot="16200000" flipH="1">
-            <a:off x="3330454" y="1715960"/>
+            <a:off x="3660063" y="2928072"/>
             <a:ext cx="432141" cy="1713340"/>
           </a:xfrm>
           <a:prstGeom prst="curvedConnector3">
@@ -5392,7 +5408,7 @@
         </p:nvCxnSpPr>
         <p:spPr>
           <a:xfrm>
-            <a:off x="3447144" y="2984110"/>
+            <a:off x="3776753" y="4196222"/>
             <a:ext cx="361690" cy="78911"/>
           </a:xfrm>
           <a:prstGeom prst="curvedConnector3">
@@ -5438,8 +5454,8 @@
         </p:nvCxnSpPr>
         <p:spPr>
           <a:xfrm>
-            <a:off x="4617135" y="1967500"/>
-            <a:ext cx="746168" cy="133398"/>
+            <a:off x="4946744" y="3254896"/>
+            <a:ext cx="746168" cy="58114"/>
           </a:xfrm>
           <a:prstGeom prst="curvedConnector2">
             <a:avLst/>
@@ -5482,7 +5498,7 @@
         </p:nvCxnSpPr>
         <p:spPr>
           <a:xfrm rot="5400000">
-            <a:off x="4234389" y="3442856"/>
+            <a:off x="4563998" y="4654968"/>
             <a:ext cx="274320" cy="63290"/>
           </a:xfrm>
           <a:prstGeom prst="curvedConnector3">
@@ -5527,7 +5543,7 @@
         </p:nvCxnSpPr>
         <p:spPr>
           <a:xfrm rot="16200000" flipH="1">
-            <a:off x="2592223" y="3432535"/>
+            <a:off x="2921832" y="4644647"/>
             <a:ext cx="353231" cy="5020"/>
           </a:xfrm>
           <a:prstGeom prst="curvedConnector3">
@@ -5572,7 +5588,7 @@
         </p:nvCxnSpPr>
         <p:spPr>
           <a:xfrm rot="5400000">
-            <a:off x="3450111" y="2658578"/>
+            <a:off x="3779720" y="3870690"/>
             <a:ext cx="274320" cy="1631846"/>
           </a:xfrm>
           <a:prstGeom prst="curvedConnector3">
@@ -5617,8 +5633,8 @@
         </p:nvCxnSpPr>
         <p:spPr>
           <a:xfrm rot="5400000">
-            <a:off x="785497" y="2228729"/>
-            <a:ext cx="292978" cy="1"/>
+            <a:off x="1115107" y="3440840"/>
+            <a:ext cx="292977" cy="1"/>
           </a:xfrm>
           <a:prstGeom prst="curvedConnector3">
             <a:avLst>
@@ -5662,8 +5678,8 @@
         </p:nvCxnSpPr>
         <p:spPr>
           <a:xfrm rot="16200000" flipH="1">
-            <a:off x="713131" y="3142711"/>
-            <a:ext cx="443300" cy="5593"/>
+            <a:off x="1112321" y="4424404"/>
+            <a:ext cx="304138" cy="5593"/>
           </a:xfrm>
           <a:prstGeom prst="curvedConnector3">
             <a:avLst>
@@ -5705,7 +5721,7 @@
         </p:nvCxnSpPr>
         <p:spPr>
           <a:xfrm>
-            <a:off x="1526345" y="2632065"/>
+            <a:off x="1855954" y="3844177"/>
             <a:ext cx="357262" cy="0"/>
           </a:xfrm>
           <a:prstGeom prst="straightConnector1">
@@ -5747,7 +5763,7 @@
         </p:nvCxnSpPr>
         <p:spPr>
           <a:xfrm flipV="1">
-            <a:off x="5226376" y="3742735"/>
+            <a:off x="5555985" y="4954847"/>
             <a:ext cx="671182" cy="2"/>
           </a:xfrm>
           <a:prstGeom prst="curvedConnector3">
@@ -5790,7 +5806,7 @@
         </p:nvCxnSpPr>
         <p:spPr>
           <a:xfrm flipV="1">
-            <a:off x="5226376" y="4086641"/>
+            <a:off x="5555985" y="5298753"/>
             <a:ext cx="671182" cy="2"/>
           </a:xfrm>
           <a:prstGeom prst="curvedConnector3">
@@ -5832,7 +5848,7 @@
         </p:nvSpPr>
         <p:spPr>
           <a:xfrm>
-            <a:off x="5017573" y="3513223"/>
+            <a:off x="5347182" y="4725335"/>
             <a:ext cx="875561" cy="246221"/>
           </a:xfrm>
           <a:prstGeom prst="rect">
@@ -5868,7 +5884,7 @@
         </p:nvSpPr>
         <p:spPr>
           <a:xfrm>
-            <a:off x="5036910" y="3734016"/>
+            <a:off x="5366519" y="4946128"/>
             <a:ext cx="849913" cy="400110"/>
           </a:xfrm>
           <a:prstGeom prst="rect">
@@ -5894,6 +5910,228 @@
                 <a:latin typeface="Century" panose="02040604050505020304" pitchFamily="18" charset="0"/>
               </a:rPr>
               <a:t>depends on</a:t>
+            </a:r>
+          </a:p>
+        </p:txBody>
+      </p:sp>
+      <p:sp>
+        <p:nvSpPr>
+          <p:cNvPr id="5" name="Rectangle 4">
+            <a:extLst>
+              <a:ext uri="{FF2B5EF4-FFF2-40B4-BE49-F238E27FC236}">
+                <a16:creationId xmlns:a16="http://schemas.microsoft.com/office/drawing/2014/main" id="{A8AB5064-020B-4972-B784-D655C03206CD}"/>
+              </a:ext>
+            </a:extLst>
+          </p:cNvPr>
+          <p:cNvSpPr/>
+          <p:nvPr/>
+        </p:nvSpPr>
+        <p:spPr>
+          <a:xfrm>
+            <a:off x="4676532" y="1661329"/>
+            <a:ext cx="1301262" cy="548617"/>
+          </a:xfrm>
+          <a:prstGeom prst="rect">
+            <a:avLst/>
+          </a:prstGeom>
+        </p:spPr>
+        <p:style>
+          <a:lnRef idx="2">
+            <a:schemeClr val="dk1"/>
+          </a:lnRef>
+          <a:fillRef idx="1">
+            <a:schemeClr val="lt1"/>
+          </a:fillRef>
+          <a:effectRef idx="0">
+            <a:schemeClr val="dk1"/>
+          </a:effectRef>
+          <a:fontRef idx="minor">
+            <a:schemeClr val="dk1"/>
+          </a:fontRef>
+        </p:style>
+        <p:txBody>
+          <a:bodyPr rtlCol="0" anchor="ctr"/>
+          <a:lstStyle/>
+          <a:p>
+            <a:pPr algn="ctr"/>
+            <a:r>
+              <a:rPr lang="en-US" dirty="0"/>
+              <a:t>Knowledge Sources</a:t>
+            </a:r>
+          </a:p>
+        </p:txBody>
+      </p:sp>
+      <p:sp>
+        <p:nvSpPr>
+          <p:cNvPr id="31" name="Rectangle 30">
+            <a:extLst>
+              <a:ext uri="{FF2B5EF4-FFF2-40B4-BE49-F238E27FC236}">
+                <a16:creationId xmlns:a16="http://schemas.microsoft.com/office/drawing/2014/main" id="{7521355C-3733-4D5E-81F0-EBFF00990DB8}"/>
+              </a:ext>
+            </a:extLst>
+          </p:cNvPr>
+          <p:cNvSpPr/>
+          <p:nvPr/>
+        </p:nvSpPr>
+        <p:spPr>
+          <a:xfrm>
+            <a:off x="2668724" y="707631"/>
+            <a:ext cx="1198702" cy="457200"/>
+          </a:xfrm>
+          <a:prstGeom prst="rect">
+            <a:avLst/>
+          </a:prstGeom>
+        </p:spPr>
+        <p:style>
+          <a:lnRef idx="2">
+            <a:schemeClr val="dk1"/>
+          </a:lnRef>
+          <a:fillRef idx="1">
+            <a:schemeClr val="lt1"/>
+          </a:fillRef>
+          <a:effectRef idx="0">
+            <a:schemeClr val="dk1"/>
+          </a:effectRef>
+          <a:fontRef idx="minor">
+            <a:schemeClr val="dk1"/>
+          </a:fontRef>
+        </p:style>
+        <p:txBody>
+          <a:bodyPr rtlCol="0" anchor="ctr"/>
+          <a:lstStyle/>
+          <a:p>
+            <a:pPr algn="ctr"/>
+            <a:r>
+              <a:rPr lang="en-US" dirty="0"/>
+              <a:t>Control</a:t>
+            </a:r>
+          </a:p>
+        </p:txBody>
+      </p:sp>
+      <p:sp>
+        <p:nvSpPr>
+          <p:cNvPr id="32" name="Rectangle 31">
+            <a:extLst>
+              <a:ext uri="{FF2B5EF4-FFF2-40B4-BE49-F238E27FC236}">
+                <a16:creationId xmlns:a16="http://schemas.microsoft.com/office/drawing/2014/main" id="{FFC6C22E-1F8A-4A53-BD1B-6E4B3C78130B}"/>
+              </a:ext>
+            </a:extLst>
+          </p:cNvPr>
+          <p:cNvSpPr/>
+          <p:nvPr/>
+        </p:nvSpPr>
+        <p:spPr>
+          <a:xfrm>
+            <a:off x="828905" y="1646038"/>
+            <a:ext cx="1352563" cy="457200"/>
+          </a:xfrm>
+          <a:prstGeom prst="rect">
+            <a:avLst/>
+          </a:prstGeom>
+        </p:spPr>
+        <p:style>
+          <a:lnRef idx="2">
+            <a:schemeClr val="dk1"/>
+          </a:lnRef>
+          <a:fillRef idx="1">
+            <a:schemeClr val="lt1"/>
+          </a:fillRef>
+          <a:effectRef idx="0">
+            <a:schemeClr val="dk1"/>
+          </a:effectRef>
+          <a:fontRef idx="minor">
+            <a:schemeClr val="dk1"/>
+          </a:fontRef>
+        </p:style>
+        <p:txBody>
+          <a:bodyPr rtlCol="0" anchor="ctr"/>
+          <a:lstStyle/>
+          <a:p>
+            <a:pPr algn="ctr"/>
+            <a:r>
+              <a:rPr lang="en-US" dirty="0"/>
+              <a:t>Blackboard</a:t>
+            </a:r>
+          </a:p>
+        </p:txBody>
+      </p:sp>
+      <p:sp>
+        <p:nvSpPr>
+          <p:cNvPr id="6" name="Smiley Face 5">
+            <a:extLst>
+              <a:ext uri="{FF2B5EF4-FFF2-40B4-BE49-F238E27FC236}">
+                <a16:creationId xmlns:a16="http://schemas.microsoft.com/office/drawing/2014/main" id="{71D0971C-1107-45E5-A0B2-6993998885B1}"/>
+              </a:ext>
+            </a:extLst>
+          </p:cNvPr>
+          <p:cNvSpPr/>
+          <p:nvPr/>
+        </p:nvSpPr>
+        <p:spPr>
+          <a:xfrm>
+            <a:off x="448823" y="644223"/>
+            <a:ext cx="594361" cy="634269"/>
+          </a:xfrm>
+          <a:prstGeom prst="smileyFace">
+            <a:avLst/>
+          </a:prstGeom>
+        </p:spPr>
+        <p:style>
+          <a:lnRef idx="2">
+            <a:schemeClr val="accent1">
+              <a:shade val="50000"/>
+            </a:schemeClr>
+          </a:lnRef>
+          <a:fillRef idx="1">
+            <a:schemeClr val="accent1"/>
+          </a:fillRef>
+          <a:effectRef idx="0">
+            <a:schemeClr val="accent1"/>
+          </a:effectRef>
+          <a:fontRef idx="minor">
+            <a:schemeClr val="lt1"/>
+          </a:fontRef>
+        </p:style>
+        <p:txBody>
+          <a:bodyPr rtlCol="0" anchor="ctr"/>
+          <a:lstStyle/>
+          <a:p>
+            <a:pPr algn="ctr"/>
+            <a:endParaRPr lang="en-US" dirty="0"/>
+          </a:p>
+        </p:txBody>
+      </p:sp>
+      <p:sp>
+        <p:nvSpPr>
+          <p:cNvPr id="7" name="TextBox 6">
+            <a:extLst>
+              <a:ext uri="{FF2B5EF4-FFF2-40B4-BE49-F238E27FC236}">
+                <a16:creationId xmlns:a16="http://schemas.microsoft.com/office/drawing/2014/main" id="{5C9EE718-C9B7-4788-9339-68E8FA2535EC}"/>
+              </a:ext>
+            </a:extLst>
+          </p:cNvPr>
+          <p:cNvSpPr txBox="1"/>
+          <p:nvPr/>
+        </p:nvSpPr>
+        <p:spPr>
+          <a:xfrm>
+            <a:off x="308344" y="1278492"/>
+            <a:ext cx="1104790" cy="369332"/>
+          </a:xfrm>
+          <a:prstGeom prst="rect">
+            <a:avLst/>
+          </a:prstGeom>
+          <a:noFill/>
+        </p:spPr>
+        <p:txBody>
+          <a:bodyPr wrap="none" rtlCol="0">
+            <a:spAutoFit/>
+          </a:bodyPr>
+          <a:lstStyle/>
+          <a:p>
+            <a:r>
+              <a:rPr lang="en-US" dirty="0"/>
+              <a:t>Instructor</a:t>
             </a:r>
           </a:p>
         </p:txBody>

</xml_diff>

<commit_message>
Update docs to be more accurate
</commit_message>
<xml_diff>
--- a/docs/_static/pedal-overview.pptx
+++ b/docs/_static/pedal-overview.pptx
@@ -256,7 +256,7 @@
           <a:p>
             <a:fld id="{3A979BF9-124F-4BB9-ADB5-5719B90CB8FD}" type="datetimeFigureOut">
               <a:rPr lang="en-US" smtClean="0"/>
-              <a:t>1/21/2019</a:t>
+              <a:t>3/10/2020</a:t>
             </a:fld>
             <a:endParaRPr lang="en-US"/>
           </a:p>
@@ -426,7 +426,7 @@
           <a:p>
             <a:fld id="{3A979BF9-124F-4BB9-ADB5-5719B90CB8FD}" type="datetimeFigureOut">
               <a:rPr lang="en-US" smtClean="0"/>
-              <a:t>1/21/2019</a:t>
+              <a:t>3/10/2020</a:t>
             </a:fld>
             <a:endParaRPr lang="en-US"/>
           </a:p>
@@ -606,7 +606,7 @@
           <a:p>
             <a:fld id="{3A979BF9-124F-4BB9-ADB5-5719B90CB8FD}" type="datetimeFigureOut">
               <a:rPr lang="en-US" smtClean="0"/>
-              <a:t>1/21/2019</a:t>
+              <a:t>3/10/2020</a:t>
             </a:fld>
             <a:endParaRPr lang="en-US"/>
           </a:p>
@@ -776,7 +776,7 @@
           <a:p>
             <a:fld id="{3A979BF9-124F-4BB9-ADB5-5719B90CB8FD}" type="datetimeFigureOut">
               <a:rPr lang="en-US" smtClean="0"/>
-              <a:t>1/21/2019</a:t>
+              <a:t>3/10/2020</a:t>
             </a:fld>
             <a:endParaRPr lang="en-US"/>
           </a:p>
@@ -1020,7 +1020,7 @@
           <a:p>
             <a:fld id="{3A979BF9-124F-4BB9-ADB5-5719B90CB8FD}" type="datetimeFigureOut">
               <a:rPr lang="en-US" smtClean="0"/>
-              <a:t>1/21/2019</a:t>
+              <a:t>3/10/2020</a:t>
             </a:fld>
             <a:endParaRPr lang="en-US"/>
           </a:p>
@@ -1252,7 +1252,7 @@
           <a:p>
             <a:fld id="{3A979BF9-124F-4BB9-ADB5-5719B90CB8FD}" type="datetimeFigureOut">
               <a:rPr lang="en-US" smtClean="0"/>
-              <a:t>1/21/2019</a:t>
+              <a:t>3/10/2020</a:t>
             </a:fld>
             <a:endParaRPr lang="en-US"/>
           </a:p>
@@ -1619,7 +1619,7 @@
           <a:p>
             <a:fld id="{3A979BF9-124F-4BB9-ADB5-5719B90CB8FD}" type="datetimeFigureOut">
               <a:rPr lang="en-US" smtClean="0"/>
-              <a:t>1/21/2019</a:t>
+              <a:t>3/10/2020</a:t>
             </a:fld>
             <a:endParaRPr lang="en-US"/>
           </a:p>
@@ -1737,7 +1737,7 @@
           <a:p>
             <a:fld id="{3A979BF9-124F-4BB9-ADB5-5719B90CB8FD}" type="datetimeFigureOut">
               <a:rPr lang="en-US" smtClean="0"/>
-              <a:t>1/21/2019</a:t>
+              <a:t>3/10/2020</a:t>
             </a:fld>
             <a:endParaRPr lang="en-US"/>
           </a:p>
@@ -1832,7 +1832,7 @@
           <a:p>
             <a:fld id="{3A979BF9-124F-4BB9-ADB5-5719B90CB8FD}" type="datetimeFigureOut">
               <a:rPr lang="en-US" smtClean="0"/>
-              <a:t>1/21/2019</a:t>
+              <a:t>3/10/2020</a:t>
             </a:fld>
             <a:endParaRPr lang="en-US"/>
           </a:p>
@@ -2109,7 +2109,7 @@
           <a:p>
             <a:fld id="{3A979BF9-124F-4BB9-ADB5-5719B90CB8FD}" type="datetimeFigureOut">
               <a:rPr lang="en-US" smtClean="0"/>
-              <a:t>1/21/2019</a:t>
+              <a:t>3/10/2020</a:t>
             </a:fld>
             <a:endParaRPr lang="en-US"/>
           </a:p>
@@ -2366,7 +2366,7 @@
           <a:p>
             <a:fld id="{3A979BF9-124F-4BB9-ADB5-5719B90CB8FD}" type="datetimeFigureOut">
               <a:rPr lang="en-US" smtClean="0"/>
-              <a:t>1/21/2019</a:t>
+              <a:t>3/10/2020</a:t>
             </a:fld>
             <a:endParaRPr lang="en-US"/>
           </a:p>
@@ -2579,7 +2579,7 @@
           <a:p>
             <a:fld id="{3A979BF9-124F-4BB9-ADB5-5719B90CB8FD}" type="datetimeFigureOut">
               <a:rPr lang="en-US" smtClean="0"/>
-              <a:t>1/21/2019</a:t>
+              <a:t>3/10/2020</a:t>
             </a:fld>
             <a:endParaRPr lang="en-US"/>
           </a:p>

</xml_diff>